<commit_message>
weeks 5 and 6
</commit_message>
<xml_diff>
--- a/slides/4 Dictionary Based Approaches.pptx
+++ b/slides/4 Dictionary Based Approaches.pptx
@@ -4,6 +4,9 @@
   <p:sldMasterIdLst>
     <p:sldMasterId id="2147483660" r:id="rId1"/>
   </p:sldMasterIdLst>
+  <p:notesMasterIdLst>
+    <p:notesMasterId r:id="rId28"/>
+  </p:notesMasterIdLst>
   <p:sldIdLst>
     <p:sldId id="256" r:id="rId2"/>
     <p:sldId id="257" r:id="rId3"/>
@@ -183,6 +186,22 @@
             <ac:spMk id="3" creationId="{BA96AA58-59E6-6D9C-D6B5-DA1059528B3D}"/>
           </ac:spMkLst>
         </pc:spChg>
+      </pc:sldChg>
+    </pc:docChg>
+  </pc:docChgLst>
+  <pc:docChgLst>
+    <pc:chgData name="Sebastian Vallejo Vera" userId="661f42ee-5565-49c4-8b1d-325f2d699b91" providerId="ADAL" clId="{8C1EFA1F-0339-5164-815E-AFC004A65A72}"/>
+    <pc:docChg chg="custSel modSld">
+      <pc:chgData name="Sebastian Vallejo Vera" userId="661f42ee-5565-49c4-8b1d-325f2d699b91" providerId="ADAL" clId="{8C1EFA1F-0339-5164-815E-AFC004A65A72}" dt="2026-01-19T17:47:25.700" v="345" actId="20577"/>
+      <pc:docMkLst>
+        <pc:docMk/>
+      </pc:docMkLst>
+      <pc:sldChg chg="modNotesTx">
+        <pc:chgData name="Sebastian Vallejo Vera" userId="661f42ee-5565-49c4-8b1d-325f2d699b91" providerId="ADAL" clId="{8C1EFA1F-0339-5164-815E-AFC004A65A72}" dt="2026-01-19T17:47:25.700" v="345" actId="20577"/>
+        <pc:sldMkLst>
+          <pc:docMk/>
+          <pc:sldMk cId="1445764860" sldId="262"/>
+        </pc:sldMkLst>
       </pc:sldChg>
     </pc:docChg>
   </pc:docChgLst>
@@ -2813,6 +2832,526 @@
 </inkml:ink>
 </file>
 
+<file path=ppt/notesMasters/notesMaster1.xml><?xml version="1.0" encoding="utf-8"?>
+<p:notesMaster xmlns:a="http://schemas.openxmlformats.org/drawingml/2006/main" xmlns:r="http://schemas.openxmlformats.org/officeDocument/2006/relationships" xmlns:p="http://schemas.openxmlformats.org/presentationml/2006/main">
+  <p:cSld>
+    <p:bg>
+      <p:bgRef idx="1001">
+        <a:schemeClr val="bg1"/>
+      </p:bgRef>
+    </p:bg>
+    <p:spTree>
+      <p:nvGrpSpPr>
+        <p:cNvPr id="1" name=""/>
+        <p:cNvGrpSpPr/>
+        <p:nvPr/>
+      </p:nvGrpSpPr>
+      <p:grpSpPr>
+        <a:xfrm>
+          <a:off x="0" y="0"/>
+          <a:ext cx="0" cy="0"/>
+          <a:chOff x="0" y="0"/>
+          <a:chExt cx="0" cy="0"/>
+        </a:xfrm>
+      </p:grpSpPr>
+      <p:sp>
+        <p:nvSpPr>
+          <p:cNvPr id="2" name="Header Placeholder 1"/>
+          <p:cNvSpPr>
+            <a:spLocks noGrp="1"/>
+          </p:cNvSpPr>
+          <p:nvPr>
+            <p:ph type="hdr" sz="quarter"/>
+          </p:nvPr>
+        </p:nvSpPr>
+        <p:spPr>
+          <a:xfrm>
+            <a:off x="0" y="0"/>
+            <a:ext cx="2971800" cy="458788"/>
+          </a:xfrm>
+          <a:prstGeom prst="rect">
+            <a:avLst/>
+          </a:prstGeom>
+        </p:spPr>
+        <p:txBody>
+          <a:bodyPr vert="horz" lIns="91440" tIns="45720" rIns="91440" bIns="45720" rtlCol="0"/>
+          <a:lstStyle>
+            <a:lvl1pPr algn="l">
+              <a:defRPr sz="1200"/>
+            </a:lvl1pPr>
+          </a:lstStyle>
+          <a:p>
+            <a:endParaRPr lang="en-US"/>
+          </a:p>
+        </p:txBody>
+      </p:sp>
+      <p:sp>
+        <p:nvSpPr>
+          <p:cNvPr id="3" name="Date Placeholder 2"/>
+          <p:cNvSpPr>
+            <a:spLocks noGrp="1"/>
+          </p:cNvSpPr>
+          <p:nvPr>
+            <p:ph type="dt" idx="1"/>
+          </p:nvPr>
+        </p:nvSpPr>
+        <p:spPr>
+          <a:xfrm>
+            <a:off x="3884613" y="0"/>
+            <a:ext cx="2971800" cy="458788"/>
+          </a:xfrm>
+          <a:prstGeom prst="rect">
+            <a:avLst/>
+          </a:prstGeom>
+        </p:spPr>
+        <p:txBody>
+          <a:bodyPr vert="horz" lIns="91440" tIns="45720" rIns="91440" bIns="45720" rtlCol="0"/>
+          <a:lstStyle>
+            <a:lvl1pPr algn="r">
+              <a:defRPr sz="1200"/>
+            </a:lvl1pPr>
+          </a:lstStyle>
+          <a:p>
+            <a:fld id="{FE1D92C0-1DAB-5F4B-95A3-7BB1A97E9C19}" type="datetimeFigureOut">
+              <a:rPr lang="en-US" smtClean="0"/>
+              <a:t>1/19/26</a:t>
+            </a:fld>
+            <a:endParaRPr lang="en-US"/>
+          </a:p>
+        </p:txBody>
+      </p:sp>
+      <p:sp>
+        <p:nvSpPr>
+          <p:cNvPr id="4" name="Slide Image Placeholder 3"/>
+          <p:cNvSpPr>
+            <a:spLocks noGrp="1" noRot="1" noChangeAspect="1"/>
+          </p:cNvSpPr>
+          <p:nvPr>
+            <p:ph type="sldImg" idx="2"/>
+          </p:nvPr>
+        </p:nvSpPr>
+        <p:spPr>
+          <a:xfrm>
+            <a:off x="685800" y="1143000"/>
+            <a:ext cx="5486400" cy="3086100"/>
+          </a:xfrm>
+          <a:prstGeom prst="rect">
+            <a:avLst/>
+          </a:prstGeom>
+          <a:noFill/>
+          <a:ln w="12700">
+            <a:solidFill>
+              <a:prstClr val="black"/>
+            </a:solidFill>
+          </a:ln>
+        </p:spPr>
+        <p:txBody>
+          <a:bodyPr vert="horz" lIns="91440" tIns="45720" rIns="91440" bIns="45720" rtlCol="0" anchor="ctr"/>
+          <a:lstStyle/>
+          <a:p>
+            <a:endParaRPr lang="en-US"/>
+          </a:p>
+        </p:txBody>
+      </p:sp>
+      <p:sp>
+        <p:nvSpPr>
+          <p:cNvPr id="5" name="Notes Placeholder 4"/>
+          <p:cNvSpPr>
+            <a:spLocks noGrp="1"/>
+          </p:cNvSpPr>
+          <p:nvPr>
+            <p:ph type="body" sz="quarter" idx="3"/>
+          </p:nvPr>
+        </p:nvSpPr>
+        <p:spPr>
+          <a:xfrm>
+            <a:off x="685800" y="4400550"/>
+            <a:ext cx="5486400" cy="3600450"/>
+          </a:xfrm>
+          <a:prstGeom prst="rect">
+            <a:avLst/>
+          </a:prstGeom>
+        </p:spPr>
+        <p:txBody>
+          <a:bodyPr vert="horz" lIns="91440" tIns="45720" rIns="91440" bIns="45720" rtlCol="0"/>
+          <a:lstStyle/>
+          <a:p>
+            <a:pPr lvl="0"/>
+            <a:r>
+              <a:rPr lang="en-US"/>
+              <a:t>Click to edit Master text styles</a:t>
+            </a:r>
+          </a:p>
+          <a:p>
+            <a:pPr lvl="1"/>
+            <a:r>
+              <a:rPr lang="en-US"/>
+              <a:t>Second level</a:t>
+            </a:r>
+          </a:p>
+          <a:p>
+            <a:pPr lvl="2"/>
+            <a:r>
+              <a:rPr lang="en-US"/>
+              <a:t>Third level</a:t>
+            </a:r>
+          </a:p>
+          <a:p>
+            <a:pPr lvl="3"/>
+            <a:r>
+              <a:rPr lang="en-US"/>
+              <a:t>Fourth level</a:t>
+            </a:r>
+          </a:p>
+          <a:p>
+            <a:pPr lvl="4"/>
+            <a:r>
+              <a:rPr lang="en-US"/>
+              <a:t>Fifth level</a:t>
+            </a:r>
+          </a:p>
+        </p:txBody>
+      </p:sp>
+      <p:sp>
+        <p:nvSpPr>
+          <p:cNvPr id="6" name="Footer Placeholder 5"/>
+          <p:cNvSpPr>
+            <a:spLocks noGrp="1"/>
+          </p:cNvSpPr>
+          <p:nvPr>
+            <p:ph type="ftr" sz="quarter" idx="4"/>
+          </p:nvPr>
+        </p:nvSpPr>
+        <p:spPr>
+          <a:xfrm>
+            <a:off x="0" y="8685213"/>
+            <a:ext cx="2971800" cy="458787"/>
+          </a:xfrm>
+          <a:prstGeom prst="rect">
+            <a:avLst/>
+          </a:prstGeom>
+        </p:spPr>
+        <p:txBody>
+          <a:bodyPr vert="horz" lIns="91440" tIns="45720" rIns="91440" bIns="45720" rtlCol="0" anchor="b"/>
+          <a:lstStyle>
+            <a:lvl1pPr algn="l">
+              <a:defRPr sz="1200"/>
+            </a:lvl1pPr>
+          </a:lstStyle>
+          <a:p>
+            <a:endParaRPr lang="en-US"/>
+          </a:p>
+        </p:txBody>
+      </p:sp>
+      <p:sp>
+        <p:nvSpPr>
+          <p:cNvPr id="7" name="Slide Number Placeholder 6"/>
+          <p:cNvSpPr>
+            <a:spLocks noGrp="1"/>
+          </p:cNvSpPr>
+          <p:nvPr>
+            <p:ph type="sldNum" sz="quarter" idx="5"/>
+          </p:nvPr>
+        </p:nvSpPr>
+        <p:spPr>
+          <a:xfrm>
+            <a:off x="3884613" y="8685213"/>
+            <a:ext cx="2971800" cy="458787"/>
+          </a:xfrm>
+          <a:prstGeom prst="rect">
+            <a:avLst/>
+          </a:prstGeom>
+        </p:spPr>
+        <p:txBody>
+          <a:bodyPr vert="horz" lIns="91440" tIns="45720" rIns="91440" bIns="45720" rtlCol="0" anchor="b"/>
+          <a:lstStyle>
+            <a:lvl1pPr algn="r">
+              <a:defRPr sz="1200"/>
+            </a:lvl1pPr>
+          </a:lstStyle>
+          <a:p>
+            <a:fld id="{100E6390-AEA6-BB49-8F9C-D9B150C5C81B}" type="slidenum">
+              <a:rPr lang="en-US" smtClean="0"/>
+              <a:t>‹#›</a:t>
+            </a:fld>
+            <a:endParaRPr lang="en-US"/>
+          </a:p>
+        </p:txBody>
+      </p:sp>
+    </p:spTree>
+    <p:extLst>
+      <p:ext uri="{BB962C8B-B14F-4D97-AF65-F5344CB8AC3E}">
+        <p14:creationId xmlns:p14="http://schemas.microsoft.com/office/powerpoint/2010/main" val="1963140947"/>
+      </p:ext>
+    </p:extLst>
+  </p:cSld>
+  <p:clrMap bg1="lt1" tx1="dk1" bg2="lt2" tx2="dk2" accent1="accent1" accent2="accent2" accent3="accent3" accent4="accent4" accent5="accent5" accent6="accent6" hlink="hlink" folHlink="folHlink"/>
+  <p:notesStyle>
+    <a:lvl1pPr marL="0" algn="l" defTabSz="914400" rtl="0" eaLnBrk="1" latinLnBrk="0" hangingPunct="1">
+      <a:defRPr sz="1200" kern="1200">
+        <a:solidFill>
+          <a:schemeClr val="tx1"/>
+        </a:solidFill>
+        <a:latin typeface="+mn-lt"/>
+        <a:ea typeface="+mn-ea"/>
+        <a:cs typeface="+mn-cs"/>
+      </a:defRPr>
+    </a:lvl1pPr>
+    <a:lvl2pPr marL="457200" algn="l" defTabSz="914400" rtl="0" eaLnBrk="1" latinLnBrk="0" hangingPunct="1">
+      <a:defRPr sz="1200" kern="1200">
+        <a:solidFill>
+          <a:schemeClr val="tx1"/>
+        </a:solidFill>
+        <a:latin typeface="+mn-lt"/>
+        <a:ea typeface="+mn-ea"/>
+        <a:cs typeface="+mn-cs"/>
+      </a:defRPr>
+    </a:lvl2pPr>
+    <a:lvl3pPr marL="914400" algn="l" defTabSz="914400" rtl="0" eaLnBrk="1" latinLnBrk="0" hangingPunct="1">
+      <a:defRPr sz="1200" kern="1200">
+        <a:solidFill>
+          <a:schemeClr val="tx1"/>
+        </a:solidFill>
+        <a:latin typeface="+mn-lt"/>
+        <a:ea typeface="+mn-ea"/>
+        <a:cs typeface="+mn-cs"/>
+      </a:defRPr>
+    </a:lvl3pPr>
+    <a:lvl4pPr marL="1371600" algn="l" defTabSz="914400" rtl="0" eaLnBrk="1" latinLnBrk="0" hangingPunct="1">
+      <a:defRPr sz="1200" kern="1200">
+        <a:solidFill>
+          <a:schemeClr val="tx1"/>
+        </a:solidFill>
+        <a:latin typeface="+mn-lt"/>
+        <a:ea typeface="+mn-ea"/>
+        <a:cs typeface="+mn-cs"/>
+      </a:defRPr>
+    </a:lvl4pPr>
+    <a:lvl5pPr marL="1828800" algn="l" defTabSz="914400" rtl="0" eaLnBrk="1" latinLnBrk="0" hangingPunct="1">
+      <a:defRPr sz="1200" kern="1200">
+        <a:solidFill>
+          <a:schemeClr val="tx1"/>
+        </a:solidFill>
+        <a:latin typeface="+mn-lt"/>
+        <a:ea typeface="+mn-ea"/>
+        <a:cs typeface="+mn-cs"/>
+      </a:defRPr>
+    </a:lvl5pPr>
+    <a:lvl6pPr marL="2286000" algn="l" defTabSz="914400" rtl="0" eaLnBrk="1" latinLnBrk="0" hangingPunct="1">
+      <a:defRPr sz="1200" kern="1200">
+        <a:solidFill>
+          <a:schemeClr val="tx1"/>
+        </a:solidFill>
+        <a:latin typeface="+mn-lt"/>
+        <a:ea typeface="+mn-ea"/>
+        <a:cs typeface="+mn-cs"/>
+      </a:defRPr>
+    </a:lvl6pPr>
+    <a:lvl7pPr marL="2743200" algn="l" defTabSz="914400" rtl="0" eaLnBrk="1" latinLnBrk="0" hangingPunct="1">
+      <a:defRPr sz="1200" kern="1200">
+        <a:solidFill>
+          <a:schemeClr val="tx1"/>
+        </a:solidFill>
+        <a:latin typeface="+mn-lt"/>
+        <a:ea typeface="+mn-ea"/>
+        <a:cs typeface="+mn-cs"/>
+      </a:defRPr>
+    </a:lvl7pPr>
+    <a:lvl8pPr marL="3200400" algn="l" defTabSz="914400" rtl="0" eaLnBrk="1" latinLnBrk="0" hangingPunct="1">
+      <a:defRPr sz="1200" kern="1200">
+        <a:solidFill>
+          <a:schemeClr val="tx1"/>
+        </a:solidFill>
+        <a:latin typeface="+mn-lt"/>
+        <a:ea typeface="+mn-ea"/>
+        <a:cs typeface="+mn-cs"/>
+      </a:defRPr>
+    </a:lvl8pPr>
+    <a:lvl9pPr marL="3657600" algn="l" defTabSz="914400" rtl="0" eaLnBrk="1" latinLnBrk="0" hangingPunct="1">
+      <a:defRPr sz="1200" kern="1200">
+        <a:solidFill>
+          <a:schemeClr val="tx1"/>
+        </a:solidFill>
+        <a:latin typeface="+mn-lt"/>
+        <a:ea typeface="+mn-ea"/>
+        <a:cs typeface="+mn-cs"/>
+      </a:defRPr>
+    </a:lvl9pPr>
+  </p:notesStyle>
+</p:notesMaster>
+</file>
+
+<file path=ppt/notesSlides/notesSlide1.xml><?xml version="1.0" encoding="utf-8"?>
+<p:notes xmlns:a="http://schemas.openxmlformats.org/drawingml/2006/main" xmlns:r="http://schemas.openxmlformats.org/officeDocument/2006/relationships" xmlns:p="http://schemas.openxmlformats.org/presentationml/2006/main">
+  <p:cSld>
+    <p:spTree>
+      <p:nvGrpSpPr>
+        <p:cNvPr id="1" name=""/>
+        <p:cNvGrpSpPr/>
+        <p:nvPr/>
+      </p:nvGrpSpPr>
+      <p:grpSpPr>
+        <a:xfrm>
+          <a:off x="0" y="0"/>
+          <a:ext cx="0" cy="0"/>
+          <a:chOff x="0" y="0"/>
+          <a:chExt cx="0" cy="0"/>
+        </a:xfrm>
+      </p:grpSpPr>
+      <p:sp>
+        <p:nvSpPr>
+          <p:cNvPr id="2" name="Slide Image Placeholder 1"/>
+          <p:cNvSpPr>
+            <a:spLocks noGrp="1" noRot="1" noChangeAspect="1"/>
+          </p:cNvSpPr>
+          <p:nvPr>
+            <p:ph type="sldImg"/>
+          </p:nvPr>
+        </p:nvSpPr>
+        <p:spPr/>
+      </p:sp>
+      <p:sp>
+        <p:nvSpPr>
+          <p:cNvPr id="3" name="Notes Placeholder 2"/>
+          <p:cNvSpPr>
+            <a:spLocks noGrp="1"/>
+          </p:cNvSpPr>
+          <p:nvPr>
+            <p:ph type="body" idx="1"/>
+          </p:nvPr>
+        </p:nvSpPr>
+        <p:spPr/>
+        <p:txBody>
+          <a:bodyPr/>
+          <a:lstStyle/>
+          <a:p>
+            <a:r>
+              <a:rPr lang="en-US" dirty="0"/>
+              <a:t>In Young and Soroka (2012), they show that there is little overlap across dictionaries that claim to capture the same concept (e.g., positive and negative emotion). What does this tell us about dictionaries? Remember, even with these ‘simply’ approaches, validation is paramount. </a:t>
+            </a:r>
+          </a:p>
+        </p:txBody>
+      </p:sp>
+      <p:sp>
+        <p:nvSpPr>
+          <p:cNvPr id="4" name="Slide Number Placeholder 3"/>
+          <p:cNvSpPr>
+            <a:spLocks noGrp="1"/>
+          </p:cNvSpPr>
+          <p:nvPr>
+            <p:ph type="sldNum" sz="quarter" idx="5"/>
+          </p:nvPr>
+        </p:nvSpPr>
+        <p:spPr/>
+        <p:txBody>
+          <a:bodyPr/>
+          <a:lstStyle/>
+          <a:p>
+            <a:fld id="{100E6390-AEA6-BB49-8F9C-D9B150C5C81B}" type="slidenum">
+              <a:rPr lang="en-US" smtClean="0"/>
+              <a:t>10</a:t>
+            </a:fld>
+            <a:endParaRPr lang="en-US"/>
+          </a:p>
+        </p:txBody>
+      </p:sp>
+    </p:spTree>
+    <p:extLst>
+      <p:ext uri="{BB962C8B-B14F-4D97-AF65-F5344CB8AC3E}">
+        <p14:creationId xmlns:p14="http://schemas.microsoft.com/office/powerpoint/2010/main" val="3537661857"/>
+      </p:ext>
+    </p:extLst>
+  </p:cSld>
+  <p:clrMapOvr>
+    <a:masterClrMapping/>
+  </p:clrMapOvr>
+</p:notes>
+</file>
+
+<file path=ppt/notesSlides/notesSlide2.xml><?xml version="1.0" encoding="utf-8"?>
+<p:notes xmlns:a="http://schemas.openxmlformats.org/drawingml/2006/main" xmlns:r="http://schemas.openxmlformats.org/officeDocument/2006/relationships" xmlns:p="http://schemas.openxmlformats.org/presentationml/2006/main">
+  <p:cSld>
+    <p:spTree>
+      <p:nvGrpSpPr>
+        <p:cNvPr id="1" name=""/>
+        <p:cNvGrpSpPr/>
+        <p:nvPr/>
+      </p:nvGrpSpPr>
+      <p:grpSpPr>
+        <a:xfrm>
+          <a:off x="0" y="0"/>
+          <a:ext cx="0" cy="0"/>
+          <a:chOff x="0" y="0"/>
+          <a:chExt cx="0" cy="0"/>
+        </a:xfrm>
+      </p:grpSpPr>
+      <p:sp>
+        <p:nvSpPr>
+          <p:cNvPr id="2" name="Slide Image Placeholder 1"/>
+          <p:cNvSpPr>
+            <a:spLocks noGrp="1" noRot="1" noChangeAspect="1"/>
+          </p:cNvSpPr>
+          <p:nvPr>
+            <p:ph type="sldImg"/>
+          </p:nvPr>
+        </p:nvSpPr>
+        <p:spPr/>
+      </p:sp>
+      <p:sp>
+        <p:nvSpPr>
+          <p:cNvPr id="3" name="Notes Placeholder 2"/>
+          <p:cNvSpPr>
+            <a:spLocks noGrp="1"/>
+          </p:cNvSpPr>
+          <p:nvPr>
+            <p:ph type="body" idx="1"/>
+          </p:nvPr>
+        </p:nvSpPr>
+        <p:spPr/>
+        <p:txBody>
+          <a:bodyPr/>
+          <a:lstStyle/>
+          <a:p>
+            <a:endParaRPr lang="en-US" dirty="0"/>
+          </a:p>
+        </p:txBody>
+      </p:sp>
+      <p:sp>
+        <p:nvSpPr>
+          <p:cNvPr id="4" name="Slide Number Placeholder 3"/>
+          <p:cNvSpPr>
+            <a:spLocks noGrp="1"/>
+          </p:cNvSpPr>
+          <p:nvPr>
+            <p:ph type="sldNum" sz="quarter" idx="5"/>
+          </p:nvPr>
+        </p:nvSpPr>
+        <p:spPr/>
+        <p:txBody>
+          <a:bodyPr/>
+          <a:lstStyle/>
+          <a:p>
+            <a:fld id="{100E6390-AEA6-BB49-8F9C-D9B150C5C81B}" type="slidenum">
+              <a:rPr lang="en-US" smtClean="0"/>
+              <a:t>25</a:t>
+            </a:fld>
+            <a:endParaRPr lang="en-US"/>
+          </a:p>
+        </p:txBody>
+      </p:sp>
+    </p:spTree>
+    <p:extLst>
+      <p:ext uri="{BB962C8B-B14F-4D97-AF65-F5344CB8AC3E}">
+        <p14:creationId xmlns:p14="http://schemas.microsoft.com/office/powerpoint/2010/main" val="1386816516"/>
+      </p:ext>
+    </p:extLst>
+  </p:cSld>
+  <p:clrMapOvr>
+    <a:masterClrMapping/>
+  </p:clrMapOvr>
+</p:notes>
+</file>
+
 <file path=ppt/slideLayouts/slideLayout1.xml><?xml version="1.0" encoding="utf-8"?>
 <p:sldLayout xmlns:a="http://schemas.openxmlformats.org/drawingml/2006/main" xmlns:r="http://schemas.openxmlformats.org/officeDocument/2006/relationships" xmlns:p="http://schemas.openxmlformats.org/presentationml/2006/main" showMasterSp="0" type="title" preserve="1">
   <p:cSld name="Title Slide">
@@ -4031,7 +4570,7 @@
           <a:p>
             <a:fld id="{E53CB8A1-6DCF-8A4A-B6E9-215719BD0320}" type="datetimeFigureOut">
               <a:rPr lang="en-US" smtClean="0"/>
-              <a:t>1/18/26</a:t>
+              <a:t>1/19/26</a:t>
             </a:fld>
             <a:endParaRPr lang="en-US"/>
           </a:p>
@@ -4276,7 +4815,7 @@
           <a:p>
             <a:fld id="{E53CB8A1-6DCF-8A4A-B6E9-215719BD0320}" type="datetimeFigureOut">
               <a:rPr lang="en-US" smtClean="0"/>
-              <a:t>1/18/26</a:t>
+              <a:t>1/19/26</a:t>
             </a:fld>
             <a:endParaRPr lang="en-US"/>
           </a:p>
@@ -4456,7 +4995,7 @@
           <a:p>
             <a:fld id="{E53CB8A1-6DCF-8A4A-B6E9-215719BD0320}" type="datetimeFigureOut">
               <a:rPr lang="en-US" smtClean="0"/>
-              <a:t>1/18/26</a:t>
+              <a:t>1/19/26</a:t>
             </a:fld>
             <a:endParaRPr lang="en-US"/>
           </a:p>
@@ -4626,7 +5165,7 @@
           <a:p>
             <a:fld id="{E53CB8A1-6DCF-8A4A-B6E9-215719BD0320}" type="datetimeFigureOut">
               <a:rPr lang="en-US" smtClean="0"/>
-              <a:t>1/18/26</a:t>
+              <a:t>1/19/26</a:t>
             </a:fld>
             <a:endParaRPr lang="en-US"/>
           </a:p>
@@ -4902,7 +5441,7 @@
           <a:p>
             <a:fld id="{E53CB8A1-6DCF-8A4A-B6E9-215719BD0320}" type="datetimeFigureOut">
               <a:rPr lang="en-US" smtClean="0"/>
-              <a:t>1/18/26</a:t>
+              <a:t>1/19/26</a:t>
             </a:fld>
             <a:endParaRPr lang="en-US"/>
           </a:p>
@@ -6103,7 +6642,7 @@
           <a:p>
             <a:fld id="{E53CB8A1-6DCF-8A4A-B6E9-215719BD0320}" type="datetimeFigureOut">
               <a:rPr lang="en-US" smtClean="0"/>
-              <a:t>1/18/26</a:t>
+              <a:t>1/19/26</a:t>
             </a:fld>
             <a:endParaRPr lang="en-US"/>
           </a:p>
@@ -6493,7 +7032,7 @@
           <a:p>
             <a:fld id="{E53CB8A1-6DCF-8A4A-B6E9-215719BD0320}" type="datetimeFigureOut">
               <a:rPr lang="en-US" smtClean="0"/>
-              <a:t>1/18/26</a:t>
+              <a:t>1/19/26</a:t>
             </a:fld>
             <a:endParaRPr lang="en-US"/>
           </a:p>
@@ -6616,7 +7155,7 @@
           <a:p>
             <a:fld id="{E53CB8A1-6DCF-8A4A-B6E9-215719BD0320}" type="datetimeFigureOut">
               <a:rPr lang="en-US" smtClean="0"/>
-              <a:t>1/18/26</a:t>
+              <a:t>1/19/26</a:t>
             </a:fld>
             <a:endParaRPr lang="en-US"/>
           </a:p>
@@ -6711,7 +7250,7 @@
           <a:p>
             <a:fld id="{E53CB8A1-6DCF-8A4A-B6E9-215719BD0320}" type="datetimeFigureOut">
               <a:rPr lang="en-US" smtClean="0"/>
-              <a:t>1/18/26</a:t>
+              <a:t>1/19/26</a:t>
             </a:fld>
             <a:endParaRPr lang="en-US"/>
           </a:p>
@@ -7474,7 +8013,7 @@
           <a:p>
             <a:fld id="{E53CB8A1-6DCF-8A4A-B6E9-215719BD0320}" type="datetimeFigureOut">
               <a:rPr lang="en-US" smtClean="0"/>
-              <a:t>1/18/26</a:t>
+              <a:t>1/19/26</a:t>
             </a:fld>
             <a:endParaRPr lang="en-US"/>
           </a:p>
@@ -8314,7 +8853,7 @@
           <a:p>
             <a:fld id="{E53CB8A1-6DCF-8A4A-B6E9-215719BD0320}" type="datetimeFigureOut">
               <a:rPr lang="en-US" smtClean="0"/>
-              <a:t>1/18/26</a:t>
+              <a:t>1/19/26</a:t>
             </a:fld>
             <a:endParaRPr lang="en-US"/>
           </a:p>
@@ -8541,7 +9080,7 @@
           <a:p>
             <a:fld id="{E53CB8A1-6DCF-8A4A-B6E9-215719BD0320}" type="datetimeFigureOut">
               <a:rPr lang="en-US" smtClean="0"/>
-              <a:t>1/18/26</a:t>
+              <a:t>1/19/26</a:t>
             </a:fld>
             <a:endParaRPr lang="en-US"/>
           </a:p>
@@ -9719,7 +10258,7 @@
           <p:nvPr/>
         </p:nvPicPr>
         <p:blipFill>
-          <a:blip r:embed="rId2"/>
+          <a:blip r:embed="rId3"/>
           <a:stretch>
             <a:fillRect/>
           </a:stretch>
@@ -15002,7 +15541,7 @@
           <p:nvPr/>
         </p:nvPicPr>
         <p:blipFill>
-          <a:blip r:embed="rId2"/>
+          <a:blip r:embed="rId3"/>
           <a:stretch>
             <a:fillRect/>
           </a:stretch>
@@ -15077,7 +15616,7 @@
         </p:grpSpPr>
         <mc:AlternateContent xmlns:mc="http://schemas.openxmlformats.org/markup-compatibility/2006" xmlns:p14="http://schemas.microsoft.com/office/powerpoint/2010/main" xmlns:aink="http://schemas.microsoft.com/office/drawing/2016/ink">
           <mc:Choice Requires="p14 aink">
-            <p:contentPart p14:bwMode="auto" r:id="rId3">
+            <p:contentPart p14:bwMode="auto" r:id="rId4">
               <p14:nvContentPartPr>
                 <p14:cNvPr id="6" name="Ink 5">
                   <a:extLst>
@@ -15109,7 +15648,7 @@
                 <p:nvPr/>
               </p:nvPicPr>
               <p:blipFill>
-                <a:blip r:embed="rId4"/>
+                <a:blip r:embed="rId5"/>
                 <a:stretch>
                   <a:fillRect/>
                 </a:stretch>
@@ -15128,7 +15667,7 @@
         </mc:AlternateContent>
         <mc:AlternateContent xmlns:mc="http://schemas.openxmlformats.org/markup-compatibility/2006" xmlns:p14="http://schemas.microsoft.com/office/powerpoint/2010/main" xmlns:aink="http://schemas.microsoft.com/office/drawing/2016/ink">
           <mc:Choice Requires="p14 aink">
-            <p:contentPart p14:bwMode="auto" r:id="rId5">
+            <p:contentPart p14:bwMode="auto" r:id="rId6">
               <p14:nvContentPartPr>
                 <p14:cNvPr id="7" name="Ink 6">
                   <a:extLst>
@@ -15160,7 +15699,7 @@
                 <p:nvPr/>
               </p:nvPicPr>
               <p:blipFill>
-                <a:blip r:embed="rId6"/>
+                <a:blip r:embed="rId7"/>
                 <a:stretch>
                   <a:fillRect/>
                 </a:stretch>
@@ -19487,4 +20026,319 @@
     </a:ext>
   </a:extLst>
 </a:theme>
+</file>
+
+<file path=ppt/theme/theme2.xml><?xml version="1.0" encoding="utf-8"?>
+<a:theme xmlns:a="http://schemas.openxmlformats.org/drawingml/2006/main" name="Office Theme">
+  <a:themeElements>
+    <a:clrScheme name="Office">
+      <a:dk1>
+        <a:sysClr val="windowText" lastClr="000000"/>
+      </a:dk1>
+      <a:lt1>
+        <a:sysClr val="window" lastClr="FFFFFF"/>
+      </a:lt1>
+      <a:dk2>
+        <a:srgbClr val="0E2841"/>
+      </a:dk2>
+      <a:lt2>
+        <a:srgbClr val="E8E8E8"/>
+      </a:lt2>
+      <a:accent1>
+        <a:srgbClr val="156082"/>
+      </a:accent1>
+      <a:accent2>
+        <a:srgbClr val="E97132"/>
+      </a:accent2>
+      <a:accent3>
+        <a:srgbClr val="196B24"/>
+      </a:accent3>
+      <a:accent4>
+        <a:srgbClr val="0F9ED5"/>
+      </a:accent4>
+      <a:accent5>
+        <a:srgbClr val="A02B93"/>
+      </a:accent5>
+      <a:accent6>
+        <a:srgbClr val="4EA72E"/>
+      </a:accent6>
+      <a:hlink>
+        <a:srgbClr val="467886"/>
+      </a:hlink>
+      <a:folHlink>
+        <a:srgbClr val="96607D"/>
+      </a:folHlink>
+    </a:clrScheme>
+    <a:fontScheme name="Office">
+      <a:majorFont>
+        <a:latin typeface="Aptos Display" panose="02110004020202020204"/>
+        <a:ea typeface=""/>
+        <a:cs typeface=""/>
+        <a:font script="Jpan" typeface="游ゴシック Light"/>
+        <a:font script="Hang" typeface="맑은 고딕"/>
+        <a:font script="Hans" typeface="等线 Light"/>
+        <a:font script="Hant" typeface="新細明體"/>
+        <a:font script="Arab" typeface="Times New Roman"/>
+        <a:font script="Hebr" typeface="Times New Roman"/>
+        <a:font script="Thai" typeface="Angsana New"/>
+        <a:font script="Ethi" typeface="Nyala"/>
+        <a:font script="Beng" typeface="Vrinda"/>
+        <a:font script="Gujr" typeface="Shruti"/>
+        <a:font script="Khmr" typeface="MoolBoran"/>
+        <a:font script="Knda" typeface="Tunga"/>
+        <a:font script="Guru" typeface="Raavi"/>
+        <a:font script="Cans" typeface="Euphemia"/>
+        <a:font script="Cher" typeface="Plantagenet Cherokee"/>
+        <a:font script="Yiii" typeface="Microsoft Yi Baiti"/>
+        <a:font script="Tibt" typeface="Microsoft Himalaya"/>
+        <a:font script="Thaa" typeface="MV Boli"/>
+        <a:font script="Deva" typeface="Mangal"/>
+        <a:font script="Telu" typeface="Gautami"/>
+        <a:font script="Taml" typeface="Latha"/>
+        <a:font script="Syrc" typeface="Estrangelo Edessa"/>
+        <a:font script="Orya" typeface="Kalinga"/>
+        <a:font script="Mlym" typeface="Kartika"/>
+        <a:font script="Laoo" typeface="DokChampa"/>
+        <a:font script="Sinh" typeface="Iskoola Pota"/>
+        <a:font script="Mong" typeface="Mongolian Baiti"/>
+        <a:font script="Viet" typeface="Times New Roman"/>
+        <a:font script="Uigh" typeface="Microsoft Uighur"/>
+        <a:font script="Geor" typeface="Sylfaen"/>
+        <a:font script="Armn" typeface="Arial"/>
+        <a:font script="Bugi" typeface="Leelawadee UI"/>
+        <a:font script="Bopo" typeface="Microsoft JhengHei"/>
+        <a:font script="Java" typeface="Javanese Text"/>
+        <a:font script="Lisu" typeface="Segoe UI"/>
+        <a:font script="Mymr" typeface="Myanmar Text"/>
+        <a:font script="Nkoo" typeface="Ebrima"/>
+        <a:font script="Olck" typeface="Nirmala UI"/>
+        <a:font script="Osma" typeface="Ebrima"/>
+        <a:font script="Phag" typeface="Phagspa"/>
+        <a:font script="Syrn" typeface="Estrangelo Edessa"/>
+        <a:font script="Syrj" typeface="Estrangelo Edessa"/>
+        <a:font script="Syre" typeface="Estrangelo Edessa"/>
+        <a:font script="Sora" typeface="Nirmala UI"/>
+        <a:font script="Tale" typeface="Microsoft Tai Le"/>
+        <a:font script="Talu" typeface="Microsoft New Tai Lue"/>
+        <a:font script="Tfng" typeface="Ebrima"/>
+      </a:majorFont>
+      <a:minorFont>
+        <a:latin typeface="Aptos" panose="02110004020202020204"/>
+        <a:ea typeface=""/>
+        <a:cs typeface=""/>
+        <a:font script="Jpan" typeface="游ゴシック"/>
+        <a:font script="Hang" typeface="맑은 고딕"/>
+        <a:font script="Hans" typeface="等线"/>
+        <a:font script="Hant" typeface="新細明體"/>
+        <a:font script="Arab" typeface="Arial"/>
+        <a:font script="Hebr" typeface="Arial"/>
+        <a:font script="Thai" typeface="Cordia New"/>
+        <a:font script="Ethi" typeface="Nyala"/>
+        <a:font script="Beng" typeface="Vrinda"/>
+        <a:font script="Gujr" typeface="Shruti"/>
+        <a:font script="Khmr" typeface="DaunPenh"/>
+        <a:font script="Knda" typeface="Tunga"/>
+        <a:font script="Guru" typeface="Raavi"/>
+        <a:font script="Cans" typeface="Euphemia"/>
+        <a:font script="Cher" typeface="Plantagenet Cherokee"/>
+        <a:font script="Yiii" typeface="Microsoft Yi Baiti"/>
+        <a:font script="Tibt" typeface="Microsoft Himalaya"/>
+        <a:font script="Thaa" typeface="MV Boli"/>
+        <a:font script="Deva" typeface="Mangal"/>
+        <a:font script="Telu" typeface="Gautami"/>
+        <a:font script="Taml" typeface="Latha"/>
+        <a:font script="Syrc" typeface="Estrangelo Edessa"/>
+        <a:font script="Orya" typeface="Kalinga"/>
+        <a:font script="Mlym" typeface="Kartika"/>
+        <a:font script="Laoo" typeface="DokChampa"/>
+        <a:font script="Sinh" typeface="Iskoola Pota"/>
+        <a:font script="Mong" typeface="Mongolian Baiti"/>
+        <a:font script="Viet" typeface="Arial"/>
+        <a:font script="Uigh" typeface="Microsoft Uighur"/>
+        <a:font script="Geor" typeface="Sylfaen"/>
+        <a:font script="Armn" typeface="Arial"/>
+        <a:font script="Bugi" typeface="Leelawadee UI"/>
+        <a:font script="Bopo" typeface="Microsoft JhengHei"/>
+        <a:font script="Java" typeface="Javanese Text"/>
+        <a:font script="Lisu" typeface="Segoe UI"/>
+        <a:font script="Mymr" typeface="Myanmar Text"/>
+        <a:font script="Nkoo" typeface="Ebrima"/>
+        <a:font script="Olck" typeface="Nirmala UI"/>
+        <a:font script="Osma" typeface="Ebrima"/>
+        <a:font script="Phag" typeface="Phagspa"/>
+        <a:font script="Syrn" typeface="Estrangelo Edessa"/>
+        <a:font script="Syrj" typeface="Estrangelo Edessa"/>
+        <a:font script="Syre" typeface="Estrangelo Edessa"/>
+        <a:font script="Sora" typeface="Nirmala UI"/>
+        <a:font script="Tale" typeface="Microsoft Tai Le"/>
+        <a:font script="Talu" typeface="Microsoft New Tai Lue"/>
+        <a:font script="Tfng" typeface="Ebrima"/>
+      </a:minorFont>
+    </a:fontScheme>
+    <a:fmtScheme name="Office">
+      <a:fillStyleLst>
+        <a:solidFill>
+          <a:schemeClr val="phClr"/>
+        </a:solidFill>
+        <a:gradFill rotWithShape="1">
+          <a:gsLst>
+            <a:gs pos="0">
+              <a:schemeClr val="phClr">
+                <a:lumMod val="110000"/>
+                <a:satMod val="105000"/>
+                <a:tint val="67000"/>
+              </a:schemeClr>
+            </a:gs>
+            <a:gs pos="50000">
+              <a:schemeClr val="phClr">
+                <a:lumMod val="105000"/>
+                <a:satMod val="103000"/>
+                <a:tint val="73000"/>
+              </a:schemeClr>
+            </a:gs>
+            <a:gs pos="100000">
+              <a:schemeClr val="phClr">
+                <a:lumMod val="105000"/>
+                <a:satMod val="109000"/>
+                <a:tint val="81000"/>
+              </a:schemeClr>
+            </a:gs>
+          </a:gsLst>
+          <a:lin ang="5400000" scaled="0"/>
+        </a:gradFill>
+        <a:gradFill rotWithShape="1">
+          <a:gsLst>
+            <a:gs pos="0">
+              <a:schemeClr val="phClr">
+                <a:satMod val="103000"/>
+                <a:lumMod val="102000"/>
+                <a:tint val="94000"/>
+              </a:schemeClr>
+            </a:gs>
+            <a:gs pos="50000">
+              <a:schemeClr val="phClr">
+                <a:satMod val="110000"/>
+                <a:lumMod val="100000"/>
+                <a:shade val="100000"/>
+              </a:schemeClr>
+            </a:gs>
+            <a:gs pos="100000">
+              <a:schemeClr val="phClr">
+                <a:lumMod val="99000"/>
+                <a:satMod val="120000"/>
+                <a:shade val="78000"/>
+              </a:schemeClr>
+            </a:gs>
+          </a:gsLst>
+          <a:lin ang="5400000" scaled="0"/>
+        </a:gradFill>
+      </a:fillStyleLst>
+      <a:lnStyleLst>
+        <a:ln w="12700" cap="flat" cmpd="sng" algn="ctr">
+          <a:solidFill>
+            <a:schemeClr val="phClr"/>
+          </a:solidFill>
+          <a:prstDash val="solid"/>
+          <a:miter lim="800000"/>
+        </a:ln>
+        <a:ln w="19050" cap="flat" cmpd="sng" algn="ctr">
+          <a:solidFill>
+            <a:schemeClr val="phClr"/>
+          </a:solidFill>
+          <a:prstDash val="solid"/>
+          <a:miter lim="800000"/>
+        </a:ln>
+        <a:ln w="25400" cap="flat" cmpd="sng" algn="ctr">
+          <a:solidFill>
+            <a:schemeClr val="phClr"/>
+          </a:solidFill>
+          <a:prstDash val="solid"/>
+          <a:miter lim="800000"/>
+        </a:ln>
+      </a:lnStyleLst>
+      <a:effectStyleLst>
+        <a:effectStyle>
+          <a:effectLst/>
+        </a:effectStyle>
+        <a:effectStyle>
+          <a:effectLst/>
+        </a:effectStyle>
+        <a:effectStyle>
+          <a:effectLst>
+            <a:outerShdw blurRad="57150" dist="19050" dir="5400000" algn="ctr" rotWithShape="0">
+              <a:srgbClr val="000000">
+                <a:alpha val="63000"/>
+              </a:srgbClr>
+            </a:outerShdw>
+          </a:effectLst>
+        </a:effectStyle>
+      </a:effectStyleLst>
+      <a:bgFillStyleLst>
+        <a:solidFill>
+          <a:schemeClr val="phClr"/>
+        </a:solidFill>
+        <a:solidFill>
+          <a:schemeClr val="phClr">
+            <a:tint val="95000"/>
+            <a:satMod val="170000"/>
+          </a:schemeClr>
+        </a:solidFill>
+        <a:gradFill rotWithShape="1">
+          <a:gsLst>
+            <a:gs pos="0">
+              <a:schemeClr val="phClr">
+                <a:tint val="93000"/>
+                <a:satMod val="150000"/>
+                <a:shade val="98000"/>
+                <a:lumMod val="102000"/>
+              </a:schemeClr>
+            </a:gs>
+            <a:gs pos="50000">
+              <a:schemeClr val="phClr">
+                <a:tint val="98000"/>
+                <a:satMod val="130000"/>
+                <a:shade val="90000"/>
+                <a:lumMod val="103000"/>
+              </a:schemeClr>
+            </a:gs>
+            <a:gs pos="100000">
+              <a:schemeClr val="phClr">
+                <a:shade val="63000"/>
+                <a:satMod val="120000"/>
+              </a:schemeClr>
+            </a:gs>
+          </a:gsLst>
+          <a:lin ang="5400000" scaled="0"/>
+        </a:gradFill>
+      </a:bgFillStyleLst>
+    </a:fmtScheme>
+  </a:themeElements>
+  <a:objectDefaults>
+    <a:lnDef>
+      <a:spPr/>
+      <a:bodyPr/>
+      <a:lstStyle/>
+      <a:style>
+        <a:lnRef idx="2">
+          <a:schemeClr val="accent1"/>
+        </a:lnRef>
+        <a:fillRef idx="0">
+          <a:schemeClr val="accent1"/>
+        </a:fillRef>
+        <a:effectRef idx="1">
+          <a:schemeClr val="accent1"/>
+        </a:effectRef>
+        <a:fontRef idx="minor">
+          <a:schemeClr val="tx1"/>
+        </a:fontRef>
+      </a:style>
+    </a:lnDef>
+  </a:objectDefaults>
+  <a:extraClrSchemeLst/>
+  <a:extLst>
+    <a:ext uri="{05A4C25C-085E-4340-85A3-A5531E510DB2}">
+      <thm15:themeFamily xmlns:thm15="http://schemas.microsoft.com/office/thememl/2012/main" name="Office Theme" id="{2E142A2C-CD16-42D6-873A-C26D2A0506FA}" vid="{1BDDFF52-6CD6-40A5-AB3C-68EB2F1E4D0A}"/>
+    </a:ext>
+  </a:extLst>
+</a:theme>
 </file>
</xml_diff>